<commit_message>
Update Easy CQRS PowerPoint presentation (#2)
</commit_message>
<xml_diff>
--- a/src/Web/EasyCQRSWithASPNETandMediatR.pptx
+++ b/src/Web/EasyCQRSWithASPNETandMediatR.pptx
@@ -33591,7 +33591,7 @@
         <p:spPr>
           <a:xfrm>
             <a:off x="1154955" y="3282043"/>
-            <a:ext cx="7099298" cy="2873827"/>
+            <a:ext cx="10008914" cy="2873827"/>
           </a:xfrm>
         </p:spPr>
         <p:txBody>
@@ -45911,7 +45911,12 @@
             <p:ph idx="1"/>
           </p:nvPr>
         </p:nvSpPr>
-        <p:spPr/>
+        <p:spPr>
+          <a:xfrm>
+            <a:off x="1154955" y="2603499"/>
+            <a:ext cx="8761412" cy="3995193"/>
+          </a:xfrm>
+        </p:spPr>
         <p:txBody>
           <a:bodyPr>
             <a:normAutofit/>
@@ -45933,11 +45938,7 @@
           <a:p>
             <a:r>
               <a:rPr lang="en-US" dirty="0" smtClean="0"/>
-              <a:t>Keep reads and </a:t>
-            </a:r>
-            <a:r>
-              <a:rPr lang="en-US" smtClean="0"/>
-              <a:t>writes separate</a:t>
+              <a:t>Keep reads and writes separate</a:t>
             </a:r>
             <a:endParaRPr lang="en-US" dirty="0"/>
           </a:p>
@@ -45970,8 +45971,20 @@
             <a:pPr lvl="1"/>
             <a:r>
               <a:rPr lang="en-US" dirty="0"/>
-              <a:t>Ex. Sometimes fields are required, sometimes not</a:t>
+              <a:t>Ex. Sometimes fields are required, sometimes </a:t>
             </a:r>
+            <a:r>
+              <a:rPr lang="en-US" dirty="0" smtClean="0"/>
+              <a:t>not</a:t>
+            </a:r>
+          </a:p>
+          <a:p>
+            <a:pPr lvl="1"/>
+            <a:r>
+              <a:rPr lang="en-US" dirty="0" smtClean="0"/>
+              <a:t>Ex. Different queries against the same underlying entity</a:t>
+            </a:r>
+            <a:endParaRPr lang="en-US" dirty="0"/>
           </a:p>
           <a:p>
             <a:endParaRPr lang="en-US" dirty="0"/>

</xml_diff>

<commit_message>
Update Easy CQRS PowerPoint presentation (#2) (#3)
</commit_message>
<xml_diff>
--- a/src/Web/EasyCQRSWithASPNETandMediatR.pptx
+++ b/src/Web/EasyCQRSWithASPNETandMediatR.pptx
@@ -33591,7 +33591,7 @@
         <p:spPr>
           <a:xfrm>
             <a:off x="1154955" y="3282043"/>
-            <a:ext cx="7099298" cy="2873827"/>
+            <a:ext cx="10008914" cy="2873827"/>
           </a:xfrm>
         </p:spPr>
         <p:txBody>
@@ -45911,7 +45911,12 @@
             <p:ph idx="1"/>
           </p:nvPr>
         </p:nvSpPr>
-        <p:spPr/>
+        <p:spPr>
+          <a:xfrm>
+            <a:off x="1154955" y="2603499"/>
+            <a:ext cx="8761412" cy="3995193"/>
+          </a:xfrm>
+        </p:spPr>
         <p:txBody>
           <a:bodyPr>
             <a:normAutofit/>
@@ -45933,11 +45938,7 @@
           <a:p>
             <a:r>
               <a:rPr lang="en-US" dirty="0" smtClean="0"/>
-              <a:t>Keep reads and </a:t>
-            </a:r>
-            <a:r>
-              <a:rPr lang="en-US" smtClean="0"/>
-              <a:t>writes separate</a:t>
+              <a:t>Keep reads and writes separate</a:t>
             </a:r>
             <a:endParaRPr lang="en-US" dirty="0"/>
           </a:p>
@@ -45970,8 +45971,20 @@
             <a:pPr lvl="1"/>
             <a:r>
               <a:rPr lang="en-US" dirty="0"/>
-              <a:t>Ex. Sometimes fields are required, sometimes not</a:t>
+              <a:t>Ex. Sometimes fields are required, sometimes </a:t>
             </a:r>
+            <a:r>
+              <a:rPr lang="en-US" dirty="0" smtClean="0"/>
+              <a:t>not</a:t>
+            </a:r>
+          </a:p>
+          <a:p>
+            <a:pPr lvl="1"/>
+            <a:r>
+              <a:rPr lang="en-US" dirty="0" smtClean="0"/>
+              <a:t>Ex. Different queries against the same underlying entity</a:t>
+            </a:r>
+            <a:endParaRPr lang="en-US" dirty="0"/>
           </a:p>
           <a:p>
             <a:endParaRPr lang="en-US" dirty="0"/>

</xml_diff>